<commit_message>
added backend recipes search, adapted pptx, cleaned some code
</commit_message>
<xml_diff>
--- a/docs/EatBalanced_Presentation_Klonner.pptx
+++ b/docs/EatBalanced_Presentation_Klonner.pptx
@@ -406,7 +406,7 @@
             <a:fld id="{90FB30C2-88FE-43E2-BC08-96A5A2047C0E}" type="datetimeFigureOut">
               <a:rPr lang="de-DE" smtClean="0"/>
               <a:pPr/>
-              <a:t>13.03.2018</a:t>
+              <a:t>15.03.2018</a:t>
             </a:fld>
             <a:endParaRPr lang="de-AT" dirty="0"/>
           </a:p>
@@ -599,7 +599,7 @@
             <a:fld id="{90FB30C2-88FE-43E2-BC08-96A5A2047C0E}" type="datetimeFigureOut">
               <a:rPr lang="de-DE" smtClean="0"/>
               <a:pPr/>
-              <a:t>13.03.2018</a:t>
+              <a:t>15.03.2018</a:t>
             </a:fld>
             <a:endParaRPr lang="de-AT" dirty="0"/>
           </a:p>
@@ -786,7 +786,7 @@
             <a:fld id="{90FB30C2-88FE-43E2-BC08-96A5A2047C0E}" type="datetimeFigureOut">
               <a:rPr lang="de-DE" smtClean="0"/>
               <a:pPr/>
-              <a:t>13.03.2018</a:t>
+              <a:t>15.03.2018</a:t>
             </a:fld>
             <a:endParaRPr lang="de-AT" dirty="0"/>
           </a:p>
@@ -1051,7 +1051,7 @@
             <a:fld id="{90FB30C2-88FE-43E2-BC08-96A5A2047C0E}" type="datetimeFigureOut">
               <a:rPr lang="de-DE" smtClean="0"/>
               <a:pPr/>
-              <a:t>13.03.2018</a:t>
+              <a:t>15.03.2018</a:t>
             </a:fld>
             <a:endParaRPr lang="de-AT" dirty="0"/>
           </a:p>
@@ -1469,7 +1469,7 @@
             <a:fld id="{90FB30C2-88FE-43E2-BC08-96A5A2047C0E}" type="datetimeFigureOut">
               <a:rPr lang="de-DE" smtClean="0"/>
               <a:pPr/>
-              <a:t>13.03.2018</a:t>
+              <a:t>15.03.2018</a:t>
             </a:fld>
             <a:endParaRPr lang="de-AT" dirty="0"/>
           </a:p>
@@ -1713,7 +1713,7 @@
             <a:fld id="{90FB30C2-88FE-43E2-BC08-96A5A2047C0E}" type="datetimeFigureOut">
               <a:rPr lang="de-DE" smtClean="0"/>
               <a:pPr/>
-              <a:t>13.03.2018</a:t>
+              <a:t>15.03.2018</a:t>
             </a:fld>
             <a:endParaRPr lang="de-AT" dirty="0"/>
           </a:p>
@@ -1951,7 +1951,7 @@
             <a:fld id="{90FB30C2-88FE-43E2-BC08-96A5A2047C0E}" type="datetimeFigureOut">
               <a:rPr lang="de-DE" smtClean="0"/>
               <a:pPr/>
-              <a:t>13.03.2018</a:t>
+              <a:t>15.03.2018</a:t>
             </a:fld>
             <a:endParaRPr lang="de-AT" dirty="0"/>
           </a:p>
@@ -2148,7 +2148,7 @@
             <a:fld id="{90FB30C2-88FE-43E2-BC08-96A5A2047C0E}" type="datetimeFigureOut">
               <a:rPr lang="de-DE" smtClean="0"/>
               <a:pPr/>
-              <a:t>13.03.2018</a:t>
+              <a:t>15.03.2018</a:t>
             </a:fld>
             <a:endParaRPr lang="de-AT" dirty="0"/>
           </a:p>
@@ -2248,7 +2248,7 @@
             <a:fld id="{90FB30C2-88FE-43E2-BC08-96A5A2047C0E}" type="datetimeFigureOut">
               <a:rPr lang="de-DE" smtClean="0"/>
               <a:pPr/>
-              <a:t>13.03.2018</a:t>
+              <a:t>15.03.2018</a:t>
             </a:fld>
             <a:endParaRPr lang="de-AT" dirty="0"/>
           </a:p>
@@ -2386,7 +2386,7 @@
             <a:fld id="{90FB30C2-88FE-43E2-BC08-96A5A2047C0E}" type="datetimeFigureOut">
               <a:rPr lang="de-DE" smtClean="0"/>
               <a:pPr/>
-              <a:t>13.03.2018</a:t>
+              <a:t>15.03.2018</a:t>
             </a:fld>
             <a:endParaRPr lang="de-AT" dirty="0"/>
           </a:p>
@@ -2906,7 +2906,7 @@
             <a:fld id="{90FB30C2-88FE-43E2-BC08-96A5A2047C0E}" type="datetimeFigureOut">
               <a:rPr lang="de-DE" smtClean="0"/>
               <a:pPr/>
-              <a:t>13.03.2018</a:t>
+              <a:t>15.03.2018</a:t>
             </a:fld>
             <a:endParaRPr lang="de-AT" dirty="0"/>
           </a:p>
@@ -3169,7 +3169,7 @@
             <a:fld id="{90FB30C2-88FE-43E2-BC08-96A5A2047C0E}" type="datetimeFigureOut">
               <a:rPr lang="de-DE" smtClean="0"/>
               <a:pPr/>
-              <a:t>13.03.2018</a:t>
+              <a:t>15.03.2018</a:t>
             </a:fld>
             <a:endParaRPr lang="de-AT" dirty="0"/>
           </a:p>
@@ -4742,20 +4742,23 @@
             <a:pPr lvl="1"/>
             <a:r>
               <a:rPr lang="de-AT" dirty="0" smtClean="0"/>
-              <a:t>mit Desktop oder Smartphone</a:t>
+              <a:t>mit Desktop </a:t>
+            </a:r>
+            <a:r>
+              <a:rPr lang="de-AT" dirty="0" smtClean="0"/>
+              <a:t>(exkl. IE) oder </a:t>
+            </a:r>
+            <a:r>
+              <a:rPr lang="de-AT" dirty="0" smtClean="0"/>
+              <a:t>Smartphone</a:t>
             </a:r>
           </a:p>
           <a:p>
             <a:pPr lvl="1"/>
             <a:r>
               <a:rPr lang="de-AT" dirty="0" smtClean="0"/>
-              <a:t>beim Kochen Rezept vom </a:t>
-            </a:r>
-            <a:r>
-              <a:rPr lang="de-AT" dirty="0" smtClean="0"/>
-              <a:t>Smartphone verwenden</a:t>
-            </a:r>
-            <a:endParaRPr lang="de-AT" dirty="0" smtClean="0"/>
+              <a:t>beim Kochen Rezept vom Smartphone verwenden</a:t>
+            </a:r>
           </a:p>
           <a:p>
             <a:pPr lvl="1"/>
@@ -4777,7 +4780,6 @@
               <a:rPr lang="de-AT" dirty="0" smtClean="0"/>
               <a:t> erstellen</a:t>
             </a:r>
-            <a:endParaRPr lang="de-AT" dirty="0" smtClean="0"/>
           </a:p>
           <a:p>
             <a:pPr lvl="1"/>
@@ -5333,11 +5335,7 @@
             </a:r>
             <a:r>
               <a:rPr lang="de-AT" sz="2400" dirty="0" smtClean="0"/>
-              <a:t>-Way-Data </a:t>
-            </a:r>
-            <a:r>
-              <a:rPr lang="de-AT" sz="2400" dirty="0" smtClean="0"/>
-              <a:t>Binding</a:t>
+              <a:t>-Way-Data Binding</a:t>
             </a:r>
           </a:p>
           <a:p>
@@ -5346,7 +5344,6 @@
               <a:rPr lang="de-AT" sz="2400" dirty="0" smtClean="0"/>
               <a:t>Modularer Aufbau: Hierarchie aus Komponenten und Services</a:t>
             </a:r>
-            <a:endParaRPr lang="de-AT" sz="2400" dirty="0" smtClean="0"/>
           </a:p>
           <a:p>
             <a:pPr lvl="1"/>
@@ -5363,11 +5360,7 @@
             <a:pPr lvl="1"/>
             <a:r>
               <a:rPr lang="de-AT" sz="2400" dirty="0" smtClean="0"/>
-              <a:t>Angular </a:t>
-            </a:r>
-            <a:r>
-              <a:rPr lang="de-AT" sz="2400" dirty="0" smtClean="0"/>
-              <a:t>CLI (</a:t>
+              <a:t>Angular CLI (</a:t>
             </a:r>
             <a:r>
               <a:rPr lang="de-AT" sz="2400" dirty="0" err="1" smtClean="0"/>

</xml_diff>

<commit_message>
implemented recipeSearch in frontend, finished presentation
</commit_message>
<xml_diff>
--- a/docs/EatBalanced_Presentation_Klonner.pptx
+++ b/docs/EatBalanced_Presentation_Klonner.pptx
@@ -4009,8 +4009,13 @@
             </a:pPr>
             <a:r>
               <a:rPr lang="de-AT" u="sng" dirty="0" smtClean="0"/>
-              <a:t>Essen nach Ernährungsplan:</a:t>
-            </a:r>
+              <a:t>Essen </a:t>
+            </a:r>
+            <a:r>
+              <a:rPr lang="de-AT" u="sng" dirty="0" smtClean="0"/>
+              <a:t>anhand eines Ernährungsplans:</a:t>
+            </a:r>
+            <a:endParaRPr lang="de-AT" u="sng" dirty="0" smtClean="0"/>
           </a:p>
           <a:p>
             <a:pPr>
@@ -4018,7 +4023,15 @@
             </a:pPr>
             <a:r>
               <a:rPr lang="de-AT" sz="2400" dirty="0" smtClean="0"/>
-              <a:t>    Auf Basis eines fertigen, ausgewogenen Ernährungsplans mit definierten Rezepten soll genau die benötigte Menge an Energie aufgenommen werden:</a:t>
+              <a:t>    Auf Basis eines fertigen, ausgewogenen Ernährungsplans mit definierten Rezepten soll </a:t>
+            </a:r>
+            <a:r>
+              <a:rPr lang="de-AT" sz="2400" dirty="0" smtClean="0"/>
+              <a:t>nur genau </a:t>
+            </a:r>
+            <a:r>
+              <a:rPr lang="de-AT" sz="2400" dirty="0" smtClean="0"/>
+              <a:t>die benötigte Menge an Energie aufgenommen werden:</a:t>
             </a:r>
           </a:p>
           <a:p>
@@ -4724,81 +4737,73 @@
           <a:lstStyle/>
           <a:p>
             <a:r>
-              <a:rPr lang="de-AT" dirty="0" smtClean="0"/>
+              <a:rPr lang="de-AT" sz="2800" dirty="0" smtClean="0"/>
               <a:t>Rezeptdatenbank aus Ernährungsplan</a:t>
             </a:r>
           </a:p>
           <a:p>
             <a:r>
-              <a:rPr lang="de-AT" dirty="0" err="1" smtClean="0"/>
+              <a:rPr lang="de-AT" sz="2800" dirty="0" err="1" smtClean="0"/>
               <a:t>Menüplan</a:t>
             </a:r>
             <a:r>
-              <a:rPr lang="de-AT" dirty="0" smtClean="0"/>
+              <a:rPr lang="de-AT" sz="2800" dirty="0" smtClean="0"/>
               <a:t> erstellen (für Haushalt)</a:t>
             </a:r>
           </a:p>
           <a:p>
             <a:pPr lvl="1"/>
             <a:r>
-              <a:rPr lang="de-AT" dirty="0" smtClean="0"/>
-              <a:t>mit Desktop </a:t>
-            </a:r>
-            <a:r>
-              <a:rPr lang="de-AT" dirty="0" smtClean="0"/>
-              <a:t>(exkl. IE) oder </a:t>
-            </a:r>
-            <a:r>
-              <a:rPr lang="de-AT" dirty="0" smtClean="0"/>
-              <a:t>Smartphone</a:t>
+              <a:rPr lang="de-AT" sz="2400" dirty="0" smtClean="0"/>
+              <a:t>mit Desktop (exkl. IE) oder Smartphone</a:t>
             </a:r>
           </a:p>
           <a:p>
             <a:pPr lvl="1"/>
             <a:r>
-              <a:rPr lang="de-AT" dirty="0" smtClean="0"/>
+              <a:rPr lang="de-AT" sz="2400" dirty="0" smtClean="0"/>
               <a:t>beim Kochen Rezept vom Smartphone verwenden</a:t>
             </a:r>
           </a:p>
           <a:p>
             <a:pPr lvl="1"/>
             <a:r>
-              <a:rPr lang="de-AT" dirty="0" smtClean="0"/>
+              <a:rPr lang="de-AT" sz="2400" dirty="0" smtClean="0"/>
               <a:t>User-spezifische Anpassung der Rezepte</a:t>
             </a:r>
           </a:p>
           <a:p>
             <a:r>
-              <a:rPr lang="de-AT" dirty="0" smtClean="0"/>
+              <a:rPr lang="de-AT" sz="2800" dirty="0" smtClean="0"/>
               <a:t>Einkaufsliste aus </a:t>
             </a:r>
             <a:r>
-              <a:rPr lang="de-AT" dirty="0" err="1" smtClean="0"/>
+              <a:rPr lang="de-AT" sz="2800" dirty="0" err="1" smtClean="0"/>
               <a:t>Menüplan</a:t>
             </a:r>
             <a:r>
-              <a:rPr lang="de-AT" dirty="0" smtClean="0"/>
+              <a:rPr lang="de-AT" sz="2800" dirty="0" smtClean="0"/>
               <a:t> erstellen</a:t>
             </a:r>
           </a:p>
           <a:p>
             <a:pPr lvl="1"/>
             <a:r>
-              <a:rPr lang="de-AT" dirty="0" smtClean="0"/>
+              <a:rPr lang="de-AT" sz="2400" dirty="0" smtClean="0"/>
               <a:t>Einkaufen mit dem Smartphone</a:t>
             </a:r>
           </a:p>
           <a:p>
             <a:pPr lvl="1"/>
             <a:r>
-              <a:rPr lang="de-AT" dirty="0" smtClean="0"/>
+              <a:rPr lang="de-AT" sz="2400" dirty="0" smtClean="0"/>
               <a:t>Einträge löschen</a:t>
             </a:r>
           </a:p>
           <a:p>
             <a:pPr lvl="1"/>
             <a:r>
-              <a:rPr lang="de-AT" dirty="0" smtClean="0"/>
+              <a:rPr lang="de-AT" sz="2400" dirty="0" smtClean="0"/>
               <a:t>sortiert nach Supermarktbereichen</a:t>
             </a:r>
           </a:p>
@@ -4880,8 +4885,8 @@
         </p:nvSpPr>
         <p:spPr>
           <a:xfrm>
-            <a:off x="142844" y="1571612"/>
-            <a:ext cx="8786842" cy="1318310"/>
+            <a:off x="714348" y="1571612"/>
+            <a:ext cx="7572428" cy="1195199"/>
           </a:xfrm>
           <a:prstGeom prst="rect">
             <a:avLst/>
@@ -4897,7 +4902,7 @@
               <a:buNone/>
             </a:pPr>
             <a:r>
-              <a:rPr lang="de-AT" sz="2800" dirty="0" smtClean="0"/>
+              <a:rPr lang="de-AT" sz="2400" dirty="0" smtClean="0"/>
               <a:t>z.B. Rezept mit 400 kcal aus Ernährungsplan: 1500 kcal/Tag</a:t>
             </a:r>
           </a:p>
@@ -4906,7 +4911,7 @@
               <a:buNone/>
             </a:pPr>
             <a:r>
-              <a:rPr lang="de-AT" sz="2000" dirty="0" smtClean="0"/>
+              <a:rPr lang="de-AT" sz="1800" dirty="0" smtClean="0"/>
               <a:t>Faktor User 1 (Energiebedarf: 1400 kcal) = 1400/1500 = 0.93</a:t>
             </a:r>
           </a:p>
@@ -4915,7 +4920,7 @@
               <a:buNone/>
             </a:pPr>
             <a:r>
-              <a:rPr lang="de-AT" sz="2000" dirty="0" smtClean="0"/>
+              <a:rPr lang="de-AT" sz="1800" dirty="0" smtClean="0"/>
               <a:t>Faktor User 2 (Energiebedarf: 2100 kcal) = 2100/1500 = 1.40</a:t>
             </a:r>
           </a:p>
@@ -6597,7 +6602,7 @@
         </p:nvSpPr>
         <p:spPr>
           <a:xfrm>
-            <a:off x="7643834" y="3643314"/>
+            <a:off x="7643834" y="3500438"/>
             <a:ext cx="1214446" cy="369332"/>
           </a:xfrm>
           <a:prstGeom prst="rect">
@@ -6729,7 +6734,7 @@
         </p:nvSpPr>
         <p:spPr>
           <a:xfrm>
-            <a:off x="6507" y="3143248"/>
+            <a:off x="0" y="3000372"/>
             <a:ext cx="1214446" cy="369332"/>
           </a:xfrm>
           <a:prstGeom prst="rect">
@@ -6906,7 +6911,7 @@
         </p:blipFill>
         <p:spPr bwMode="auto">
           <a:xfrm>
-            <a:off x="8072462" y="5143512"/>
+            <a:off x="7929586" y="5072074"/>
             <a:ext cx="887068" cy="800101"/>
           </a:xfrm>
           <a:prstGeom prst="rect">

</xml_diff>